<commit_message>
Made small improvements to coin changing slides
</commit_message>
<xml_diff>
--- a/slides/DP_Greedy_coinChange.pptx
+++ b/slides/DP_Greedy_coinChange.pptx
@@ -6115,7 +6115,7 @@
             <a:pPr lvl="1"/>
             <a:r>
               <a:rPr lang="en-US" dirty="0"/>
-              <a:t>In each case above, I can swap a dime in for either the 2 nickels or for 10 pennies</a:t>
+              <a:t>In each case above, I can swap a dime in for some combination of nickels or pennies</a:t>
             </a:r>
           </a:p>
           <a:p>
@@ -8510,6 +8510,142 @@
           </a:p>
         </p:txBody>
       </p:sp>
+      <p:sp>
+        <p:nvSpPr>
+          <p:cNvPr id="8" name="TextBox 7">
+            <a:extLst>
+              <a:ext uri="{FF2B5EF4-FFF2-40B4-BE49-F238E27FC236}">
+                <a16:creationId xmlns:a16="http://schemas.microsoft.com/office/drawing/2014/main" id="{82517C85-306E-804D-83C6-BB35E60A02F2}"/>
+              </a:ext>
+            </a:extLst>
+          </p:cNvPr>
+          <p:cNvSpPr txBox="1"/>
+          <p:nvPr/>
+        </p:nvSpPr>
+        <p:spPr>
+          <a:xfrm>
+            <a:off x="9281725" y="5463569"/>
+            <a:ext cx="2438394" cy="1200329"/>
+          </a:xfrm>
+          <a:prstGeom prst="rect">
+            <a:avLst/>
+          </a:prstGeom>
+          <a:noFill/>
+        </p:spPr>
+        <p:txBody>
+          <a:bodyPr wrap="square" rtlCol="0">
+            <a:spAutoFit/>
+          </a:bodyPr>
+          <a:lstStyle/>
+          <a:p>
+            <a:r>
+              <a:rPr lang="en-US" sz="2400" dirty="0">
+                <a:latin typeface="+mj-lt"/>
+              </a:rPr>
+              <a:t>10-cent</a:t>
+            </a:r>
+          </a:p>
+          <a:p>
+            <a:r>
+              <a:rPr lang="en-US" sz="2400" dirty="0">
+                <a:latin typeface="+mj-lt"/>
+              </a:rPr>
+              <a:t>6-cent</a:t>
+            </a:r>
+          </a:p>
+          <a:p>
+            <a:r>
+              <a:rPr lang="en-US" sz="2400" dirty="0">
+                <a:latin typeface="+mj-lt"/>
+              </a:rPr>
+              <a:t>1-cent</a:t>
+            </a:r>
+          </a:p>
+        </p:txBody>
+      </p:sp>
+      <p:sp>
+        <p:nvSpPr>
+          <p:cNvPr id="9" name="TextBox 8">
+            <a:extLst>
+              <a:ext uri="{FF2B5EF4-FFF2-40B4-BE49-F238E27FC236}">
+                <a16:creationId xmlns:a16="http://schemas.microsoft.com/office/drawing/2014/main" id="{89D492B1-686D-E243-9AED-E32445B40CAC}"/>
+              </a:ext>
+            </a:extLst>
+          </p:cNvPr>
+          <p:cNvSpPr txBox="1"/>
+          <p:nvPr/>
+        </p:nvSpPr>
+        <p:spPr>
+          <a:xfrm>
+            <a:off x="9596032" y="4654959"/>
+            <a:ext cx="1367939" cy="369332"/>
+          </a:xfrm>
+          <a:prstGeom prst="rect">
+            <a:avLst/>
+          </a:prstGeom>
+          <a:noFill/>
+        </p:spPr>
+        <p:txBody>
+          <a:bodyPr wrap="none" rtlCol="0">
+            <a:spAutoFit/>
+          </a:bodyPr>
+          <a:lstStyle/>
+          <a:p>
+            <a:r>
+              <a:rPr lang="en-US" b="1" dirty="0">
+                <a:solidFill>
+                  <a:srgbClr val="FF0000"/>
+                </a:solidFill>
+              </a:rPr>
+              <a:t>Our answer!</a:t>
+            </a:r>
+          </a:p>
+        </p:txBody>
+      </p:sp>
+      <p:cxnSp>
+        <p:nvCxnSpPr>
+          <p:cNvPr id="11" name="Straight Connector 10">
+            <a:extLst>
+              <a:ext uri="{FF2B5EF4-FFF2-40B4-BE49-F238E27FC236}">
+                <a16:creationId xmlns:a16="http://schemas.microsoft.com/office/drawing/2014/main" id="{2E8B827B-FD46-9342-A26A-0552D9C20D23}"/>
+              </a:ext>
+            </a:extLst>
+          </p:cNvPr>
+          <p:cNvCxnSpPr>
+            <a:cxnSpLocks/>
+          </p:cNvCxnSpPr>
+          <p:nvPr/>
+        </p:nvCxnSpPr>
+        <p:spPr>
+          <a:xfrm flipH="1">
+            <a:off x="9067800" y="4986049"/>
+            <a:ext cx="838200" cy="613342"/>
+          </a:xfrm>
+          <a:prstGeom prst="line">
+            <a:avLst/>
+          </a:prstGeom>
+          <a:ln w="28575">
+            <a:solidFill>
+              <a:srgbClr val="FF0000"/>
+            </a:solidFill>
+            <a:tailEnd type="triangle" w="lg" len="med"/>
+          </a:ln>
+        </p:spPr>
+        <p:style>
+          <a:lnRef idx="1">
+            <a:schemeClr val="accent1"/>
+          </a:lnRef>
+          <a:fillRef idx="0">
+            <a:schemeClr val="accent1"/>
+          </a:fillRef>
+          <a:effectRef idx="0">
+            <a:schemeClr val="accent1"/>
+          </a:effectRef>
+          <a:fontRef idx="minor">
+            <a:schemeClr val="tx1"/>
+          </a:fontRef>
+        </p:style>
+      </p:cxnSp>
     </p:spTree>
     <p:extLst>
       <p:ext uri="{BB962C8B-B14F-4D97-AF65-F5344CB8AC3E}">
@@ -8597,150 +8733,222 @@
             <p:ph sz="quarter" idx="1"/>
           </p:nvPr>
         </p:nvSpPr>
-        <p:spPr/>
+        <p:spPr>
+          <a:xfrm>
+            <a:off x="609600" y="1295400"/>
+            <a:ext cx="10972800" cy="5060951"/>
+          </a:xfrm>
+        </p:spPr>
         <p:txBody>
           <a:bodyPr>
-            <a:normAutofit fontScale="92500" lnSpcReduction="20000"/>
+            <a:normAutofit fontScale="92500" lnSpcReduction="10000"/>
           </a:bodyPr>
           <a:lstStyle/>
           <a:p>
             <a:r>
-              <a:rPr lang="en-US" dirty="0"/>
+              <a:rPr lang="en-US" sz="2400" dirty="0"/>
               <a:t>How to solve the </a:t>
             </a:r>
             <a:r>
-              <a:rPr lang="en-US" dirty="0" err="1"/>
+              <a:rPr lang="en-US" sz="2400" dirty="0" err="1"/>
               <a:t>i,j</a:t>
             </a:r>
             <a:r>
-              <a:rPr lang="en-US" dirty="0"/>
-              <a:t> problem</a:t>
-            </a:r>
+              <a:rPr lang="en-US" sz="2400" dirty="0"/>
+              <a:t> problem   (Remember, </a:t>
+            </a:r>
+            <a:r>
+              <a:rPr lang="en-US" sz="2400" dirty="0" err="1"/>
+              <a:t>i</a:t>
+            </a:r>
+            <a:r>
+              <a:rPr lang="en-US" sz="2400" dirty="0"/>
+              <a:t> tells you which coins, and j is the amount)</a:t>
+            </a:r>
+          </a:p>
+          <a:p>
+            <a:pPr marL="0" indent="0">
+              <a:buNone/>
+            </a:pPr>
+            <a:endParaRPr lang="en-US" sz="2400" dirty="0"/>
           </a:p>
           <a:p>
             <a:pPr lvl="1"/>
             <a:r>
-              <a:rPr lang="en-US" dirty="0"/>
+              <a:rPr lang="en-US" sz="2400" dirty="0"/>
               <a:t>If </a:t>
             </a:r>
             <a:r>
-              <a:rPr lang="en-US" dirty="0" err="1"/>
+              <a:rPr lang="en-US" sz="2400" dirty="0" err="1"/>
               <a:t>denom</a:t>
             </a:r>
             <a:r>
-              <a:rPr lang="en-US" dirty="0"/>
+              <a:rPr lang="en-US" sz="2400" dirty="0"/>
               <a:t>[</a:t>
             </a:r>
             <a:r>
-              <a:rPr lang="en-US" dirty="0" err="1"/>
+              <a:rPr lang="en-US" sz="2400" dirty="0" err="1"/>
               <a:t>i</a:t>
             </a:r>
             <a:r>
-              <a:rPr lang="en-US" dirty="0"/>
-              <a:t>] &gt; j, then we don’t use this coin</a:t>
+              <a:rPr lang="en-US" sz="2400" dirty="0"/>
+              <a:t>] &gt; j, then not possible to include this coin</a:t>
             </a:r>
           </a:p>
           <a:p>
             <a:pPr lvl="2"/>
             <a:r>
-              <a:rPr lang="en-US" dirty="0"/>
+              <a:rPr lang="en-US" sz="1800" dirty="0"/>
               <a:t>Then the solution is the same as the (i+1),j problem</a:t>
             </a:r>
           </a:p>
           <a:p>
             <a:pPr lvl="2"/>
             <a:r>
-              <a:rPr lang="en-US" dirty="0"/>
+              <a:rPr lang="en-US" sz="1800" dirty="0"/>
+              <a:t>In the table, that’s the cell right below the current cell. </a:t>
+            </a:r>
+          </a:p>
+          <a:p>
+            <a:pPr lvl="2"/>
+            <a:r>
+              <a:rPr lang="en-US" sz="1800" dirty="0"/>
               <a:t>Is this making the problem simpler?</a:t>
             </a:r>
           </a:p>
           <a:p>
             <a:pPr lvl="1"/>
-            <a:endParaRPr lang="en-US" dirty="0"/>
+            <a:endParaRPr lang="en-US" sz="2400" dirty="0"/>
           </a:p>
           <a:p>
             <a:pPr lvl="1"/>
             <a:r>
-              <a:rPr lang="en-US" dirty="0"/>
-              <a:t>We could use a coin of denomination </a:t>
-            </a:r>
-            <a:r>
-              <a:rPr lang="en-US" dirty="0" err="1"/>
+              <a:rPr lang="en-US" sz="2400" dirty="0"/>
+              <a:t>Maybe the best answer </a:t>
+            </a:r>
+            <a:r>
+              <a:rPr lang="en-US" sz="2400" u="sng" dirty="0"/>
+              <a:t>does</a:t>
+            </a:r>
+            <a:r>
+              <a:rPr lang="en-US" sz="2400" dirty="0"/>
+              <a:t> use a coin of denomination </a:t>
+            </a:r>
+            <a:r>
+              <a:rPr lang="en-US" sz="2400" dirty="0" err="1"/>
               <a:t>i</a:t>
             </a:r>
-            <a:endParaRPr lang="en-US" dirty="0"/>
+            <a:endParaRPr lang="en-US" sz="2400" dirty="0"/>
           </a:p>
           <a:p>
             <a:pPr lvl="2"/>
             <a:r>
-              <a:rPr lang="en-US" dirty="0"/>
+              <a:rPr lang="en-US" sz="1800" dirty="0"/>
               <a:t>Then the solution is 1 more than the </a:t>
             </a:r>
             <a:r>
-              <a:rPr lang="en-US" dirty="0" err="1"/>
+              <a:rPr lang="en-US" sz="1800" dirty="0" err="1"/>
               <a:t>i</a:t>
             </a:r>
             <a:r>
-              <a:rPr lang="en-US" dirty="0"/>
+              <a:rPr lang="en-US" sz="1800" dirty="0"/>
               <a:t>,(j-</a:t>
             </a:r>
             <a:r>
-              <a:rPr lang="en-US" dirty="0" err="1"/>
+              <a:rPr lang="en-US" sz="1800" dirty="0" err="1"/>
               <a:t>denom</a:t>
             </a:r>
             <a:r>
-              <a:rPr lang="en-US" dirty="0"/>
+              <a:rPr lang="en-US" sz="1800" dirty="0"/>
               <a:t>[</a:t>
             </a:r>
             <a:r>
-              <a:rPr lang="en-US" dirty="0" err="1"/>
+              <a:rPr lang="en-US" sz="1800" dirty="0" err="1"/>
               <a:t>i</a:t>
             </a:r>
             <a:r>
-              <a:rPr lang="en-US" dirty="0"/>
+              <a:rPr lang="en-US" sz="1800" dirty="0"/>
               <a:t>]) problem</a:t>
             </a:r>
           </a:p>
           <a:p>
             <a:pPr lvl="2"/>
             <a:r>
-              <a:rPr lang="en-US" dirty="0" err="1"/>
+              <a:rPr lang="en-US" sz="1800" dirty="0"/>
+              <a:t>j  changes to j-</a:t>
+            </a:r>
+            <a:r>
+              <a:rPr lang="en-US" sz="1800" dirty="0" err="1"/>
+              <a:t>denom</a:t>
+            </a:r>
+            <a:r>
+              <a:rPr lang="en-US" sz="1800" dirty="0"/>
+              <a:t>[</a:t>
+            </a:r>
+            <a:r>
+              <a:rPr lang="en-US" sz="1800" dirty="0" err="1"/>
               <a:t>i</a:t>
             </a:r>
             <a:r>
-              <a:rPr lang="en-US" dirty="0"/>
+              <a:rPr lang="en-US" sz="1800" dirty="0"/>
+              <a:t>] because we subtract off the value of the coin used</a:t>
+            </a:r>
+          </a:p>
+          <a:p>
+            <a:pPr lvl="2"/>
+            <a:r>
+              <a:rPr lang="en-US" sz="1800" dirty="0" err="1"/>
+              <a:t>i</a:t>
+            </a:r>
+            <a:r>
+              <a:rPr lang="en-US" sz="1800" dirty="0"/>
               <a:t> doesn’t change because there could be multiple coins of denomination </a:t>
             </a:r>
             <a:r>
-              <a:rPr lang="en-US" dirty="0" err="1"/>
+              <a:rPr lang="en-US" sz="1800" dirty="0" err="1"/>
               <a:t>i</a:t>
             </a:r>
             <a:r>
-              <a:rPr lang="en-US" dirty="0"/>
+              <a:rPr lang="en-US" sz="1800" dirty="0"/>
               <a:t> used in the solution</a:t>
             </a:r>
           </a:p>
           <a:p>
             <a:pPr lvl="1"/>
-            <a:endParaRPr lang="en-US" dirty="0"/>
+            <a:endParaRPr lang="en-US" sz="2400" dirty="0"/>
           </a:p>
           <a:p>
             <a:pPr lvl="1"/>
             <a:r>
-              <a:rPr lang="en-US" dirty="0"/>
-              <a:t>We could NOT use a coin of denomination </a:t>
-            </a:r>
-            <a:r>
-              <a:rPr lang="en-US" dirty="0" err="1"/>
+              <a:rPr lang="en-US" sz="2400" dirty="0"/>
+              <a:t>Maybe the best answer </a:t>
+            </a:r>
+            <a:r>
+              <a:rPr lang="en-US" sz="2400" u="sng" dirty="0"/>
+              <a:t>does NOT</a:t>
+            </a:r>
+            <a:r>
+              <a:rPr lang="en-US" sz="2400" dirty="0"/>
+              <a:t> use a coin of denomination </a:t>
+            </a:r>
+            <a:r>
+              <a:rPr lang="en-US" sz="2400" dirty="0" err="1"/>
               <a:t>i</a:t>
             </a:r>
-            <a:endParaRPr lang="en-US" dirty="0"/>
+            <a:endParaRPr lang="en-US" sz="2400" dirty="0"/>
           </a:p>
           <a:p>
             <a:pPr lvl="2"/>
             <a:r>
-              <a:rPr lang="en-US" dirty="0"/>
+              <a:rPr lang="en-US" sz="1800" dirty="0"/>
               <a:t>Then the solution is the same as the (i+1),j problem</a:t>
+            </a:r>
+          </a:p>
+          <a:p>
+            <a:pPr lvl="2"/>
+            <a:r>
+              <a:rPr lang="en-US" sz="1800" dirty="0"/>
+              <a:t>In the table, that’s the cell right below the current cell</a:t>
             </a:r>
           </a:p>
         </p:txBody>
@@ -8919,7 +9127,7 @@
           <a:graphicData uri="http://schemas.openxmlformats.org/presentationml/2006/ole">
             <mc:AlternateContent xmlns:mc="http://schemas.openxmlformats.org/markup-compatibility/2006">
               <mc:Choice xmlns:v="urn:schemas-microsoft-com:vml" Requires="v">
-                <p:oleObj spid="_x0000_s1032" name="Equation" r:id="rId3" imgW="4025900" imgH="457200" progId="Equation.3">
+                <p:oleObj spid="_x0000_s1037" name="Equation" r:id="rId3" imgW="4025900" imgH="457200" progId="Equation.3">
                   <p:embed/>
                 </p:oleObj>
               </mc:Choice>
@@ -8958,7 +9166,7 @@
                       <a:noFill/>
                       <a:extLst>
                         <a:ext uri="{909E8E84-426E-40dd-AFC4-6F175D3DCCD1}">
-                          <a14:hiddenFill xmlns:a14="http://schemas.microsoft.com/office/drawing/2010/main" xmlns="">
+                          <a14:hiddenFill xmlns="" xmlns:a14="http://schemas.microsoft.com/office/drawing/2010/main">
                             <a:solidFill>
                               <a:srgbClr val="FFFFFF"/>
                             </a:solidFill>
@@ -9063,7 +9271,7 @@
         <p:spPr/>
         <p:txBody>
           <a:bodyPr>
-            <a:normAutofit fontScale="92500" lnSpcReduction="10000"/>
+            <a:normAutofit fontScale="92500" lnSpcReduction="20000"/>
           </a:bodyPr>
           <a:lstStyle/>
           <a:p>
@@ -9104,7 +9312,7 @@
           <a:p>
             <a:r>
               <a:rPr lang="en-US" dirty="0"/>
-              <a:t>We can write a solution now using recursion</a:t>
+              <a:t>We can write a solution now using memorization with a top-down solution (recursive calls), or a bottom-up approach (build a table)</a:t>
             </a:r>
           </a:p>
         </p:txBody>
@@ -9131,7 +9339,7 @@
           <a:graphicData uri="http://schemas.openxmlformats.org/presentationml/2006/ole">
             <mc:AlternateContent xmlns:mc="http://schemas.openxmlformats.org/markup-compatibility/2006">
               <mc:Choice xmlns:v="urn:schemas-microsoft-com:vml" Requires="v">
-                <p:oleObj spid="_x0000_s2056" name="Equation" r:id="rId3" imgW="4025900" imgH="457200" progId="Equation.3">
+                <p:oleObj spid="_x0000_s2061" name="Equation" r:id="rId3" imgW="4025900" imgH="457200" progId="Equation.3">
                   <p:embed/>
                 </p:oleObj>
               </mc:Choice>
@@ -9170,7 +9378,7 @@
                       <a:noFill/>
                       <a:extLst>
                         <a:ext uri="{909E8E84-426E-40dd-AFC4-6F175D3DCCD1}">
-                          <a14:hiddenFill xmlns:a14="http://schemas.microsoft.com/office/drawing/2010/main" xmlns="">
+                          <a14:hiddenFill xmlns="" xmlns:a14="http://schemas.microsoft.com/office/drawing/2010/main">
                             <a:solidFill>
                               <a:srgbClr val="FFFFFF"/>
                             </a:solidFill>
@@ -9231,10 +9439,9 @@
           <a:lstStyle/>
           <a:p>
             <a:r>
-              <a:rPr lang="en-US"/>
-              <a:t>The (non-recursive) algorithm</a:t>
-            </a:r>
-            <a:endParaRPr lang="en-US" dirty="0"/>
+              <a:rPr lang="en-US" dirty="0"/>
+              <a:t>The bottom-up algorithm</a:t>
+            </a:r>
           </a:p>
         </p:txBody>
       </p:sp>
@@ -9274,7 +9481,7 @@
         </p:nvSpPr>
         <p:spPr>
           <a:xfrm>
-            <a:off x="2667000" y="1600200"/>
+            <a:off x="1143000" y="1416070"/>
             <a:ext cx="7315200" cy="4525963"/>
           </a:xfrm>
         </p:spPr>
@@ -9482,6 +9689,112 @@
             <a:r>
               <a:rPr lang="en-US" dirty="0"/>
               <a:t>}</a:t>
+            </a:r>
+          </a:p>
+        </p:txBody>
+      </p:sp>
+      <p:sp>
+        <p:nvSpPr>
+          <p:cNvPr id="5" name="TextBox 4">
+            <a:extLst>
+              <a:ext uri="{FF2B5EF4-FFF2-40B4-BE49-F238E27FC236}">
+                <a16:creationId xmlns:a16="http://schemas.microsoft.com/office/drawing/2014/main" id="{2F33F6B4-1247-4D4B-B6CD-23C44E813DDD}"/>
+              </a:ext>
+            </a:extLst>
+          </p:cNvPr>
+          <p:cNvSpPr txBox="1"/>
+          <p:nvPr/>
+        </p:nvSpPr>
+        <p:spPr>
+          <a:xfrm>
+            <a:off x="7382172" y="1781225"/>
+            <a:ext cx="2809423" cy="523220"/>
+          </a:xfrm>
+          <a:prstGeom prst="rect">
+            <a:avLst/>
+          </a:prstGeom>
+          <a:noFill/>
+          <a:ln w="38100">
+            <a:solidFill>
+              <a:schemeClr val="accent1"/>
+            </a:solidFill>
+          </a:ln>
+        </p:spPr>
+        <p:txBody>
+          <a:bodyPr wrap="none" rtlCol="0">
+            <a:spAutoFit/>
+          </a:bodyPr>
+          <a:lstStyle/>
+          <a:p>
+            <a:r>
+              <a:rPr lang="en-US" sz="2800" b="1" dirty="0">
+                <a:solidFill>
+                  <a:srgbClr val="7030A0"/>
+                </a:solidFill>
+              </a:rPr>
+              <a:t>Time complexity?</a:t>
+            </a:r>
+          </a:p>
+        </p:txBody>
+      </p:sp>
+      <p:sp>
+        <p:nvSpPr>
+          <p:cNvPr id="6" name="TextBox 5">
+            <a:extLst>
+              <a:ext uri="{FF2B5EF4-FFF2-40B4-BE49-F238E27FC236}">
+                <a16:creationId xmlns:a16="http://schemas.microsoft.com/office/drawing/2014/main" id="{13B6597F-D407-114B-AF06-2C8A44DFB730}"/>
+              </a:ext>
+            </a:extLst>
+          </p:cNvPr>
+          <p:cNvSpPr txBox="1"/>
+          <p:nvPr/>
+        </p:nvSpPr>
+        <p:spPr>
+          <a:xfrm>
+            <a:off x="7438571" y="2669600"/>
+            <a:ext cx="4586897" cy="1015663"/>
+          </a:xfrm>
+          <a:prstGeom prst="rect">
+            <a:avLst/>
+          </a:prstGeom>
+          <a:noFill/>
+          <a:ln w="25400">
+            <a:solidFill>
+              <a:schemeClr val="accent1"/>
+            </a:solidFill>
+          </a:ln>
+        </p:spPr>
+        <p:txBody>
+          <a:bodyPr wrap="none" rtlCol="0">
+            <a:spAutoFit/>
+          </a:bodyPr>
+          <a:lstStyle/>
+          <a:p>
+            <a:r>
+              <a:rPr lang="en-US" sz="2000" dirty="0"/>
+              <a:t>Constant time to file each cell in the table.</a:t>
+            </a:r>
+            <a:br>
+              <a:rPr lang="en-US" sz="2000" dirty="0"/>
+            </a:br>
+            <a:r>
+              <a:rPr lang="en-US" sz="2000" dirty="0"/>
+              <a:t>So </a:t>
+            </a:r>
+            <a:r>
+              <a:rPr lang="en-US" sz="2000" dirty="0" err="1"/>
+              <a:t>Θ</a:t>
+            </a:r>
+            <a:r>
+              <a:rPr lang="en-US" sz="2000" dirty="0"/>
+              <a:t>(n ・ A) where n is the number of coins</a:t>
+            </a:r>
+            <a:br>
+              <a:rPr lang="en-US" sz="2000" dirty="0"/>
+            </a:br>
+            <a:r>
+              <a:rPr lang="en-US" sz="2000" dirty="0"/>
+              <a:t>and A is the amount</a:t>
             </a:r>
           </a:p>
         </p:txBody>
@@ -9532,10 +9845,9 @@
           <a:lstStyle/>
           <a:p>
             <a:r>
-              <a:rPr lang="en-US"/>
-              <a:t>But how to record the answers?</a:t>
-            </a:r>
-            <a:endParaRPr lang="en-US" dirty="0"/>
+              <a:rPr lang="en-US" dirty="0"/>
+              <a:t>But how to get the coins chosen?</a:t>
+            </a:r>
           </a:p>
         </p:txBody>
       </p:sp>
@@ -9590,7 +9902,13 @@
           <a:p>
             <a:r>
               <a:rPr lang="en-US" dirty="0"/>
-              <a:t>We’ll keep a </a:t>
+              <a:t>It’s easy to trace back through the values</a:t>
+            </a:r>
+          </a:p>
+          <a:p>
+            <a:r>
+              <a:rPr lang="en-US" dirty="0"/>
+              <a:t>Or, we could keep a </a:t>
             </a:r>
             <a:r>
               <a:rPr lang="en-US" i="1" dirty="0"/>

</xml_diff>

<commit_message>
more small improvements to coin changing slides
</commit_message>
<xml_diff>
--- a/slides/DP_Greedy_coinChange.pptx
+++ b/slides/DP_Greedy_coinChange.pptx
@@ -7423,8 +7423,21 @@
             </a:r>
             <a:r>
               <a:rPr lang="en-US" dirty="0"/>
-              <a:t> problem:</a:t>
-            </a:r>
+              <a:t> problem:       </a:t>
+            </a:r>
+            <a:r>
+              <a:rPr lang="en-US" sz="2000" dirty="0"/>
+              <a:t>(Remember, </a:t>
+            </a:r>
+            <a:r>
+              <a:rPr lang="en-US" sz="2000" dirty="0" err="1"/>
+              <a:t>i</a:t>
+            </a:r>
+            <a:r>
+              <a:rPr lang="en-US" sz="2000" dirty="0"/>
+              <a:t> is which coins, and j is the amount)</a:t>
+            </a:r>
+            <a:endParaRPr lang="en-US" dirty="0"/>
           </a:p>
           <a:p>
             <a:pPr lvl="1"/>
@@ -7489,13 +7502,13 @@
           <p:nvPr>
             <p:extLst>
               <p:ext uri="{D42A27DB-BD31-4B8C-83A1-F6EECF244321}">
-                <p14:modId xmlns:p14="http://schemas.microsoft.com/office/powerpoint/2010/main" val="3012845513"/>
+                <p14:modId xmlns:p14="http://schemas.microsoft.com/office/powerpoint/2010/main" val="632236380"/>
               </p:ext>
             </p:extLst>
           </p:nvPr>
         </p:nvGraphicFramePr>
         <p:xfrm>
-          <a:off x="3048000" y="5151120"/>
+          <a:off x="3611968" y="5091083"/>
           <a:ext cx="6096006" cy="1478280"/>
         </p:xfrm>
         <a:graphic>
@@ -8453,7 +8466,7 @@
         </p:nvSpPr>
         <p:spPr>
           <a:xfrm>
-            <a:off x="2667000" y="5879068"/>
+            <a:off x="3230968" y="5819031"/>
             <a:ext cx="260008" cy="369332"/>
           </a:xfrm>
           <a:prstGeom prst="rect">
@@ -8468,12 +8481,12 @@
           <a:lstStyle/>
           <a:p>
             <a:r>
-              <a:rPr lang="en-US" dirty="0" err="1">
+              <a:rPr lang="en-US" b="1" dirty="0" err="1">
                 <a:latin typeface="+mj-lt"/>
               </a:rPr>
               <a:t>i</a:t>
             </a:r>
-            <a:endParaRPr lang="en-US" dirty="0">
+            <a:endParaRPr lang="en-US" b="1" dirty="0">
               <a:latin typeface="+mj-lt"/>
             </a:endParaRPr>
           </a:p>
@@ -8487,7 +8500,7 @@
         </p:nvSpPr>
         <p:spPr>
           <a:xfrm>
-            <a:off x="5638800" y="4736068"/>
+            <a:off x="6202768" y="4676031"/>
             <a:ext cx="260008" cy="369332"/>
           </a:xfrm>
           <a:prstGeom prst="rect">
@@ -8502,7 +8515,7 @@
           <a:lstStyle/>
           <a:p>
             <a:r>
-              <a:rPr lang="en-US" dirty="0">
+              <a:rPr lang="en-US" b="1" dirty="0">
                 <a:latin typeface="+mj-lt"/>
               </a:rPr>
               <a:t>j</a:t>
@@ -8524,8 +8537,8 @@
         </p:nvSpPr>
         <p:spPr>
           <a:xfrm>
-            <a:off x="9281725" y="5463569"/>
-            <a:ext cx="2438394" cy="1200329"/>
+            <a:off x="9845692" y="5403532"/>
+            <a:ext cx="3138876" cy="1200329"/>
           </a:xfrm>
           <a:prstGeom prst="rect">
             <a:avLst/>
@@ -8542,23 +8555,31 @@
               <a:rPr lang="en-US" sz="2400" dirty="0">
                 <a:latin typeface="+mj-lt"/>
               </a:rPr>
-              <a:t>10-cent</a:t>
-            </a:r>
-          </a:p>
-          <a:p>
+              <a:t>Can use 1, 6 &amp; 10</a:t>
+            </a:r>
+          </a:p>
+          <a:p>
+            <a:r>
+              <a:rPr lang="en-US" sz="2400" dirty="0"/>
+              <a:t>Can use </a:t>
+            </a:r>
             <a:r>
               <a:rPr lang="en-US" sz="2400" dirty="0">
                 <a:latin typeface="+mj-lt"/>
               </a:rPr>
-              <a:t>6-cent</a:t>
-            </a:r>
-          </a:p>
-          <a:p>
+              <a:t>1 &amp; 6</a:t>
+            </a:r>
+          </a:p>
+          <a:p>
+            <a:r>
+              <a:rPr lang="en-US" sz="2400" dirty="0"/>
+              <a:t>Can use </a:t>
+            </a:r>
             <a:r>
               <a:rPr lang="en-US" sz="2400" dirty="0">
                 <a:latin typeface="+mj-lt"/>
               </a:rPr>
-              <a:t>1-cent</a:t>
+              <a:t>1</a:t>
             </a:r>
           </a:p>
         </p:txBody>
@@ -8577,7 +8598,7 @@
         </p:nvSpPr>
         <p:spPr>
           <a:xfrm>
-            <a:off x="9596032" y="4654959"/>
+            <a:off x="8947798" y="4245342"/>
             <a:ext cx="1367939" cy="369332"/>
           </a:xfrm>
           <a:prstGeom prst="rect">
@@ -8618,8 +8639,8 @@
         </p:nvCxnSpPr>
         <p:spPr>
           <a:xfrm flipH="1">
-            <a:off x="9067800" y="4986049"/>
-            <a:ext cx="838200" cy="613342"/>
+            <a:off x="9637314" y="4591814"/>
+            <a:ext cx="522686" cy="997812"/>
           </a:xfrm>
           <a:prstGeom prst="line">
             <a:avLst/>
@@ -8763,7 +8784,7 @@
             </a:r>
             <a:r>
               <a:rPr lang="en-US" sz="2400" dirty="0"/>
-              <a:t> tells you which coins, and j is the amount)</a:t>
+              <a:t> is which coins, and j is the amount)</a:t>
             </a:r>
           </a:p>
           <a:p>
@@ -9127,7 +9148,7 @@
           <a:graphicData uri="http://schemas.openxmlformats.org/presentationml/2006/ole">
             <mc:AlternateContent xmlns:mc="http://schemas.openxmlformats.org/markup-compatibility/2006">
               <mc:Choice xmlns:v="urn:schemas-microsoft-com:vml" Requires="v">
-                <p:oleObj spid="_x0000_s1037" name="Equation" r:id="rId3" imgW="4025900" imgH="457200" progId="Equation.3">
+                <p:oleObj spid="_x0000_s1039" name="Equation" r:id="rId3" imgW="4025900" imgH="457200" progId="Equation.3">
                   <p:embed/>
                 </p:oleObj>
               </mc:Choice>
@@ -9339,7 +9360,7 @@
           <a:graphicData uri="http://schemas.openxmlformats.org/presentationml/2006/ole">
             <mc:AlternateContent xmlns:mc="http://schemas.openxmlformats.org/markup-compatibility/2006">
               <mc:Choice xmlns:v="urn:schemas-microsoft-com:vml" Requires="v">
-                <p:oleObj spid="_x0000_s2061" name="Equation" r:id="rId3" imgW="4025900" imgH="457200" progId="Equation.3">
+                <p:oleObj spid="_x0000_s2063" name="Equation" r:id="rId3" imgW="4025900" imgH="457200" progId="Equation.3">
                   <p:embed/>
                 </p:oleObj>
               </mc:Choice>
@@ -10999,14 +11020,20 @@
       </p:sp>
       <p:sp>
         <p:nvSpPr>
-          <p:cNvPr id="8" name="TextBox 7"/>
+          <p:cNvPr id="9" name="TextBox 8">
+            <a:extLst>
+              <a:ext uri="{FF2B5EF4-FFF2-40B4-BE49-F238E27FC236}">
+                <a16:creationId xmlns:a16="http://schemas.microsoft.com/office/drawing/2014/main" id="{21811584-9239-2B4E-B095-2FFEE0011818}"/>
+              </a:ext>
+            </a:extLst>
+          </p:cNvPr>
           <p:cNvSpPr txBox="1"/>
           <p:nvPr/>
         </p:nvSpPr>
         <p:spPr>
           <a:xfrm>
-            <a:off x="8991600" y="5096470"/>
-            <a:ext cx="1905000" cy="923330"/>
+            <a:off x="9053124" y="5026967"/>
+            <a:ext cx="3138876" cy="1200329"/>
           </a:xfrm>
           <a:prstGeom prst="rect">
             <a:avLst/>
@@ -11020,26 +11047,34 @@
           <a:lstStyle/>
           <a:p>
             <a:r>
-              <a:rPr lang="en-US" dirty="0">
+              <a:rPr lang="en-US" sz="2400" dirty="0">
                 <a:latin typeface="+mj-lt"/>
               </a:rPr>
-              <a:t>10 cents</a:t>
-            </a:r>
-          </a:p>
-          <a:p>
-            <a:r>
-              <a:rPr lang="en-US" dirty="0">
+              <a:t>Can use 1, 6 &amp; 10</a:t>
+            </a:r>
+          </a:p>
+          <a:p>
+            <a:r>
+              <a:rPr lang="en-US" sz="2400" dirty="0"/>
+              <a:t>Can use </a:t>
+            </a:r>
+            <a:r>
+              <a:rPr lang="en-US" sz="2400" dirty="0">
                 <a:latin typeface="+mj-lt"/>
               </a:rPr>
-              <a:t>6 cents</a:t>
-            </a:r>
-          </a:p>
-          <a:p>
-            <a:r>
-              <a:rPr lang="en-US" dirty="0">
+              <a:t>1 &amp; 6</a:t>
+            </a:r>
+          </a:p>
+          <a:p>
+            <a:r>
+              <a:rPr lang="en-US" sz="2400" dirty="0"/>
+              <a:t>Can use </a:t>
+            </a:r>
+            <a:r>
+              <a:rPr lang="en-US" sz="2400" dirty="0">
                 <a:latin typeface="+mj-lt"/>
               </a:rPr>
-              <a:t>1 cent</a:t>
+              <a:t>1</a:t>
             </a:r>
           </a:p>
         </p:txBody>

</xml_diff>

<commit_message>
yet another small improvements to coin changing slides
</commit_message>
<xml_diff>
--- a/slides/DP_Greedy_coinChange.pptx
+++ b/slides/DP_Greedy_coinChange.pptx
@@ -7065,14 +7065,14 @@
             <a:pPr lvl="1"/>
             <a:r>
               <a:rPr lang="en-US" dirty="0"/>
-              <a:t>The greedy algorithm picks 10, 1, 1</a:t>
+              <a:t>The greedy algorithm picks {10, 1, 1}</a:t>
             </a:r>
           </a:p>
           <a:p>
             <a:pPr lvl="1"/>
             <a:r>
               <a:rPr lang="en-US" dirty="0"/>
-              <a:t>But 6, 6 is more optimal (fewer coins)</a:t>
+              <a:t>But {6, 6} is more optimal (fewer coins)</a:t>
             </a:r>
           </a:p>
         </p:txBody>
@@ -8501,7 +8501,7 @@
         <p:spPr>
           <a:xfrm>
             <a:off x="6202768" y="4676031"/>
-            <a:ext cx="260008" cy="369332"/>
+            <a:ext cx="2534832" cy="369332"/>
           </a:xfrm>
           <a:prstGeom prst="rect">
             <a:avLst/>
@@ -8518,7 +8518,13 @@
               <a:rPr lang="en-US" b="1" dirty="0">
                 <a:latin typeface="+mj-lt"/>
               </a:rPr>
-              <a:t>j</a:t>
+              <a:t>j   </a:t>
+            </a:r>
+            <a:r>
+              <a:rPr lang="en-US" dirty="0">
+                <a:latin typeface="+mj-lt"/>
+              </a:rPr>
+              <a:t>(the amount)</a:t>
             </a:r>
           </a:p>
         </p:txBody>
@@ -8820,8 +8826,13 @@
             <a:pPr lvl="2"/>
             <a:r>
               <a:rPr lang="en-US" sz="1800" dirty="0"/>
-              <a:t>Then the solution is the same as the (i+1),j problem</a:t>
-            </a:r>
+              <a:t>Then the solution is the same as the (i+1),j problem  (same amount, but with one fewer of </a:t>
+            </a:r>
+            <a:r>
+              <a:rPr lang="en-US" sz="1800"/>
+              <a:t>the coin-options)</a:t>
+            </a:r>
+            <a:endParaRPr lang="en-US" sz="1800" dirty="0"/>
           </a:p>
           <a:p>
             <a:pPr lvl="2"/>
@@ -9148,7 +9159,7 @@
           <a:graphicData uri="http://schemas.openxmlformats.org/presentationml/2006/ole">
             <mc:AlternateContent xmlns:mc="http://schemas.openxmlformats.org/markup-compatibility/2006">
               <mc:Choice xmlns:v="urn:schemas-microsoft-com:vml" Requires="v">
-                <p:oleObj spid="_x0000_s1039" name="Equation" r:id="rId3" imgW="4025900" imgH="457200" progId="Equation.3">
+                <p:oleObj spid="_x0000_s1041" name="Equation" r:id="rId3" imgW="4025900" imgH="457200" progId="Equation.3">
                   <p:embed/>
                 </p:oleObj>
               </mc:Choice>
@@ -9360,7 +9371,7 @@
           <a:graphicData uri="http://schemas.openxmlformats.org/presentationml/2006/ole">
             <mc:AlternateContent xmlns:mc="http://schemas.openxmlformats.org/markup-compatibility/2006">
               <mc:Choice xmlns:v="urn:schemas-microsoft-com:vml" Requires="v">
-                <p:oleObj spid="_x0000_s2063" name="Equation" r:id="rId3" imgW="4025900" imgH="457200" progId="Equation.3">
+                <p:oleObj spid="_x0000_s2065" name="Equation" r:id="rId3" imgW="4025900" imgH="457200" progId="Equation.3">
                   <p:embed/>
                 </p:oleObj>
               </mc:Choice>

</xml_diff>